<commit_message>
Removed dimensional analysis factor
</commit_message>
<xml_diff>
--- a/presentations/DT1-presentation.pptx
+++ b/presentations/DT1-presentation.pptx
@@ -429,7 +429,7 @@
           <a:p>
             <a:fld id="{B5F03D72-B907-4F07-A297-E649C91DC118}" type="datetimeFigureOut">
               <a:rPr lang="sv-SE" smtClean="0"/>
-              <a:t>2023-09-07</a:t>
+              <a:t>2023-09-08</a:t>
             </a:fld>
             <a:endParaRPr lang="sv-SE"/>
           </a:p>
@@ -843,7 +843,7 @@
           <a:p>
             <a:fld id="{B5F03D72-B907-4F07-A297-E649C91DC118}" type="datetimeFigureOut">
               <a:rPr lang="sv-SE" smtClean="0"/>
-              <a:t>2023-09-07</a:t>
+              <a:t>2023-09-08</a:t>
             </a:fld>
             <a:endParaRPr lang="sv-SE"/>
           </a:p>
@@ -1179,7 +1179,7 @@
           <a:p>
             <a:fld id="{B5F03D72-B907-4F07-A297-E649C91DC118}" type="datetimeFigureOut">
               <a:rPr lang="sv-SE" smtClean="0"/>
-              <a:t>2023-09-07</a:t>
+              <a:t>2023-09-08</a:t>
             </a:fld>
             <a:endParaRPr lang="sv-SE"/>
           </a:p>
@@ -1584,7 +1584,7 @@
           <a:p>
             <a:fld id="{B5F03D72-B907-4F07-A297-E649C91DC118}" type="datetimeFigureOut">
               <a:rPr lang="sv-SE" smtClean="0"/>
-              <a:t>2023-09-07</a:t>
+              <a:t>2023-09-08</a:t>
             </a:fld>
             <a:endParaRPr lang="sv-SE"/>
           </a:p>
@@ -2152,7 +2152,7 @@
           <a:p>
             <a:fld id="{B5F03D72-B907-4F07-A297-E649C91DC118}" type="datetimeFigureOut">
               <a:rPr lang="sv-SE" smtClean="0"/>
-              <a:t>2023-09-07</a:t>
+              <a:t>2023-09-08</a:t>
             </a:fld>
             <a:endParaRPr lang="sv-SE"/>
           </a:p>
@@ -2833,7 +2833,7 @@
           <a:p>
             <a:fld id="{B5F03D72-B907-4F07-A297-E649C91DC118}" type="datetimeFigureOut">
               <a:rPr lang="sv-SE" smtClean="0"/>
-              <a:t>2023-09-07</a:t>
+              <a:t>2023-09-08</a:t>
             </a:fld>
             <a:endParaRPr lang="sv-SE"/>
           </a:p>
@@ -3746,7 +3746,7 @@
           <a:p>
             <a:fld id="{B5F03D72-B907-4F07-A297-E649C91DC118}" type="datetimeFigureOut">
               <a:rPr lang="sv-SE" smtClean="0"/>
-              <a:t>2023-09-07</a:t>
+              <a:t>2023-09-08</a:t>
             </a:fld>
             <a:endParaRPr lang="sv-SE"/>
           </a:p>
@@ -4059,7 +4059,7 @@
           <a:p>
             <a:fld id="{B5F03D72-B907-4F07-A297-E649C91DC118}" type="datetimeFigureOut">
               <a:rPr lang="sv-SE" smtClean="0"/>
-              <a:t>2023-09-07</a:t>
+              <a:t>2023-09-08</a:t>
             </a:fld>
             <a:endParaRPr lang="sv-SE"/>
           </a:p>
@@ -4323,7 +4323,7 @@
           <a:p>
             <a:fld id="{B5F03D72-B907-4F07-A297-E649C91DC118}" type="datetimeFigureOut">
               <a:rPr lang="sv-SE" smtClean="0"/>
-              <a:t>2023-09-07</a:t>
+              <a:t>2023-09-08</a:t>
             </a:fld>
             <a:endParaRPr lang="sv-SE"/>
           </a:p>
@@ -4646,7 +4646,7 @@
           <a:p>
             <a:fld id="{B5F03D72-B907-4F07-A297-E649C91DC118}" type="datetimeFigureOut">
               <a:rPr lang="sv-SE" smtClean="0"/>
-              <a:t>2023-09-07</a:t>
+              <a:t>2023-09-08</a:t>
             </a:fld>
             <a:endParaRPr lang="sv-SE"/>
           </a:p>
@@ -5035,7 +5035,7 @@
           <a:p>
             <a:fld id="{B5F03D72-B907-4F07-A297-E649C91DC118}" type="datetimeFigureOut">
               <a:rPr lang="sv-SE" smtClean="0"/>
-              <a:t>2023-09-07</a:t>
+              <a:t>2023-09-08</a:t>
             </a:fld>
             <a:endParaRPr lang="sv-SE"/>
           </a:p>
@@ -5411,7 +5411,7 @@
           <a:p>
             <a:fld id="{B5F03D72-B907-4F07-A297-E649C91DC118}" type="datetimeFigureOut">
               <a:rPr lang="sv-SE" smtClean="0"/>
-              <a:t>2023-09-07</a:t>
+              <a:t>2023-09-08</a:t>
             </a:fld>
             <a:endParaRPr lang="sv-SE"/>
           </a:p>
@@ -5917,7 +5917,7 @@
           <a:p>
             <a:fld id="{B5F03D72-B907-4F07-A297-E649C91DC118}" type="datetimeFigureOut">
               <a:rPr lang="sv-SE" smtClean="0"/>
-              <a:t>2023-09-07</a:t>
+              <a:t>2023-09-08</a:t>
             </a:fld>
             <a:endParaRPr lang="sv-SE"/>
           </a:p>
@@ -6174,7 +6174,7 @@
           <a:p>
             <a:fld id="{B5F03D72-B907-4F07-A297-E649C91DC118}" type="datetimeFigureOut">
               <a:rPr lang="sv-SE" smtClean="0"/>
-              <a:t>2023-09-07</a:t>
+              <a:t>2023-09-08</a:t>
             </a:fld>
             <a:endParaRPr lang="sv-SE"/>
           </a:p>
@@ -6337,7 +6337,7 @@
           <a:p>
             <a:fld id="{B5F03D72-B907-4F07-A297-E649C91DC118}" type="datetimeFigureOut">
               <a:rPr lang="sv-SE" smtClean="0"/>
-              <a:t>2023-09-07</a:t>
+              <a:t>2023-09-08</a:t>
             </a:fld>
             <a:endParaRPr lang="sv-SE"/>
           </a:p>
@@ -6727,7 +6727,7 @@
           <a:p>
             <a:fld id="{B5F03D72-B907-4F07-A297-E649C91DC118}" type="datetimeFigureOut">
               <a:rPr lang="sv-SE" smtClean="0"/>
-              <a:t>2023-09-07</a:t>
+              <a:t>2023-09-08</a:t>
             </a:fld>
             <a:endParaRPr lang="sv-SE"/>
           </a:p>
@@ -7136,7 +7136,7 @@
           <a:p>
             <a:fld id="{B5F03D72-B907-4F07-A297-E649C91DC118}" type="datetimeFigureOut">
               <a:rPr lang="sv-SE" smtClean="0"/>
-              <a:t>2023-09-07</a:t>
+              <a:t>2023-09-08</a:t>
             </a:fld>
             <a:endParaRPr lang="sv-SE"/>
           </a:p>
@@ -7380,7 +7380,7 @@
           <a:p>
             <a:fld id="{B5F03D72-B907-4F07-A297-E649C91DC118}" type="datetimeFigureOut">
               <a:rPr lang="sv-SE" smtClean="0"/>
-              <a:t>2023-09-07</a:t>
+              <a:t>2023-09-08</a:t>
             </a:fld>
             <a:endParaRPr lang="sv-SE"/>
           </a:p>
@@ -7863,6 +7863,41 @@
 <file path=ppt/slides/slide2.xml><?xml version="1.0" encoding="utf-8"?>
 <p:sld xmlns:a="http://schemas.openxmlformats.org/drawingml/2006/main" xmlns:r="http://schemas.openxmlformats.org/officeDocument/2006/relationships" xmlns:p="http://schemas.openxmlformats.org/presentationml/2006/main">
   <p:cSld>
+    <p:bg>
+      <p:bgPr>
+        <a:gradFill rotWithShape="1">
+          <a:gsLst>
+            <a:gs pos="0">
+              <a:schemeClr val="bg2">
+                <a:tint val="96000"/>
+                <a:shade val="100000"/>
+                <a:hueMod val="270000"/>
+                <a:satMod val="200000"/>
+                <a:lumMod val="128000"/>
+              </a:schemeClr>
+            </a:gs>
+            <a:gs pos="50000">
+              <a:schemeClr val="bg2">
+                <a:shade val="100000"/>
+                <a:hueMod val="100000"/>
+                <a:satMod val="110000"/>
+                <a:lumMod val="130000"/>
+              </a:schemeClr>
+            </a:gs>
+            <a:gs pos="100000">
+              <a:schemeClr val="bg2">
+                <a:shade val="78000"/>
+                <a:hueMod val="44000"/>
+                <a:satMod val="200000"/>
+                <a:lumMod val="69000"/>
+              </a:schemeClr>
+            </a:gs>
+          </a:gsLst>
+          <a:lin ang="2520000" scaled="0"/>
+        </a:gradFill>
+        <a:effectLst/>
+      </p:bgPr>
+    </p:bg>
     <p:spTree>
       <p:nvGrpSpPr>
         <p:cNvPr id="1" name=""/>
@@ -7877,6 +7912,246 @@
           <a:chExt cx="0" cy="0"/>
         </a:xfrm>
       </p:grpSpPr>
+      <p:grpSp>
+        <p:nvGrpSpPr>
+          <p:cNvPr id="83" name="Group 54">
+            <a:extLst>
+              <a:ext uri="{FF2B5EF4-FFF2-40B4-BE49-F238E27FC236}">
+                <a16:creationId xmlns:a16="http://schemas.microsoft.com/office/drawing/2014/main" id="{5B988D63-FA8B-436C-902E-E5005BC0492F}"/>
+              </a:ext>
+              <a:ext uri="{C183D7F6-B498-43B3-948B-1728B52AA6E4}">
+                <adec:decorative xmlns:adec="http://schemas.microsoft.com/office/drawing/2017/decorative" val="1"/>
+              </a:ext>
+            </a:extLst>
+          </p:cNvPr>
+          <p:cNvGrpSpPr>
+            <a:grpSpLocks noGrp="1" noUngrp="1" noRot="1" noChangeAspect="1" noMove="1" noResize="1"/>
+          </p:cNvGrpSpPr>
+          <p:nvPr>
+            <p:extLst>
+              <p:ext uri="{386F3935-93C4-4BCD-93E2-E3B085C9AB24}">
+                <p16:designElem xmlns:p16="http://schemas.microsoft.com/office/powerpoint/2015/main" val="1"/>
+              </p:ext>
+            </p:extLst>
+          </p:nvPr>
+        </p:nvGrpSpPr>
+        <p:grpSpPr>
+          <a:xfrm>
+            <a:off x="-3176" y="0"/>
+            <a:ext cx="12192000" cy="6858001"/>
+            <a:chOff x="-3176" y="0"/>
+            <a:chExt cx="12192000" cy="6858001"/>
+          </a:xfrm>
+        </p:grpSpPr>
+        <p:sp useBgFill="1">
+          <p:nvSpPr>
+            <p:cNvPr id="56" name="Rectangle 55">
+              <a:extLst>
+                <a:ext uri="{FF2B5EF4-FFF2-40B4-BE49-F238E27FC236}">
+                  <a16:creationId xmlns:a16="http://schemas.microsoft.com/office/drawing/2014/main" id="{2FD177FB-983E-4035-8B7A-655342A7E190}"/>
+                </a:ext>
+                <a:ext uri="{C183D7F6-B498-43B3-948B-1728B52AA6E4}">
+                  <adec:decorative xmlns:adec="http://schemas.microsoft.com/office/drawing/2017/decorative" val="1"/>
+                </a:ext>
+              </a:extLst>
+            </p:cNvPr>
+            <p:cNvSpPr/>
+            <p:nvPr>
+              <p:extLst>
+                <p:ext uri="{386F3935-93C4-4BCD-93E2-E3B085C9AB24}">
+                  <p16:designElem xmlns:p16="http://schemas.microsoft.com/office/powerpoint/2015/main" val="1"/>
+                </p:ext>
+              </p:extLst>
+            </p:nvPr>
+          </p:nvSpPr>
+          <p:spPr>
+            <a:xfrm>
+              <a:off x="0" y="0"/>
+              <a:ext cx="12188824" cy="6858001"/>
+            </a:xfrm>
+            <a:prstGeom prst="rect">
+              <a:avLst/>
+            </a:prstGeom>
+            <a:ln>
+              <a:noFill/>
+            </a:ln>
+          </p:spPr>
+          <p:style>
+            <a:lnRef idx="2">
+              <a:schemeClr val="accent1">
+                <a:shade val="50000"/>
+              </a:schemeClr>
+            </a:lnRef>
+            <a:fillRef idx="1">
+              <a:schemeClr val="accent1"/>
+            </a:fillRef>
+            <a:effectRef idx="0">
+              <a:schemeClr val="accent1"/>
+            </a:effectRef>
+            <a:fontRef idx="minor">
+              <a:schemeClr val="lt1"/>
+            </a:fontRef>
+          </p:style>
+          <p:txBody>
+            <a:bodyPr rtlCol="0" anchor="ctr"/>
+            <a:lstStyle/>
+            <a:p>
+              <a:pPr algn="ctr"/>
+              <a:endParaRPr lang="en-US"/>
+            </a:p>
+          </p:txBody>
+        </p:sp>
+        <p:pic>
+          <p:nvPicPr>
+            <p:cNvPr id="84" name="Picture 56">
+              <a:extLst>
+                <a:ext uri="{FF2B5EF4-FFF2-40B4-BE49-F238E27FC236}">
+                  <a16:creationId xmlns:a16="http://schemas.microsoft.com/office/drawing/2014/main" id="{9596D9C3-C0FC-4500-A696-55B9F77BB7A9}"/>
+                </a:ext>
+                <a:ext uri="{C183D7F6-B498-43B3-948B-1728B52AA6E4}">
+                  <adec:decorative xmlns:adec="http://schemas.microsoft.com/office/drawing/2017/decorative" val="1"/>
+                </a:ext>
+              </a:extLst>
+            </p:cNvPr>
+            <p:cNvPicPr>
+              <a:picLocks noChangeAspect="1"/>
+            </p:cNvPicPr>
+            <p:nvPr>
+              <p:extLst>
+                <p:ext uri="{386F3935-93C4-4BCD-93E2-E3B085C9AB24}">
+                  <p16:designElem xmlns:p16="http://schemas.microsoft.com/office/powerpoint/2015/main" val="1"/>
+                </p:ext>
+              </p:extLst>
+            </p:nvPr>
+          </p:nvPicPr>
+          <p:blipFill>
+            <a:blip r:embed="rId2">
+              <a:alphaModFix amt="10000"/>
+              <a:extLst>
+                <a:ext uri="{28A0092B-C50C-407E-A947-70E740481C1C}">
+                  <a14:useLocalDpi xmlns:a14="http://schemas.microsoft.com/office/drawing/2010/main" val="0"/>
+                </a:ext>
+              </a:extLst>
+            </a:blip>
+            <a:stretch>
+              <a:fillRect/>
+            </a:stretch>
+          </p:blipFill>
+          <p:spPr>
+            <a:xfrm>
+              <a:off x="-3176" y="0"/>
+              <a:ext cx="12192000" cy="6858000"/>
+            </a:xfrm>
+            <a:prstGeom prst="rect">
+              <a:avLst/>
+            </a:prstGeom>
+          </p:spPr>
+        </p:pic>
+      </p:grpSp>
+      <p:pic>
+        <p:nvPicPr>
+          <p:cNvPr id="9" name="Bildobjekt 8" descr="En bild som visar diagram, Teknisk ritning, skiss, linje&#10;&#10;Automatiskt genererad beskrivning">
+            <a:extLst>
+              <a:ext uri="{FF2B5EF4-FFF2-40B4-BE49-F238E27FC236}">
+                <a16:creationId xmlns:a16="http://schemas.microsoft.com/office/drawing/2014/main" id="{7531EDB1-8A2C-0B41-B9FB-DF08CAE1A06A}"/>
+              </a:ext>
+            </a:extLst>
+          </p:cNvPr>
+          <p:cNvPicPr>
+            <a:picLocks noChangeAspect="1"/>
+          </p:cNvPicPr>
+          <p:nvPr/>
+        </p:nvPicPr>
+        <p:blipFill rotWithShape="1">
+          <a:blip r:embed="rId3">
+            <a:extLst>
+              <a:ext uri="{28A0092B-C50C-407E-A947-70E740481C1C}">
+                <a14:useLocalDpi xmlns:a14="http://schemas.microsoft.com/office/drawing/2010/main" val="0"/>
+              </a:ext>
+            </a:extLst>
+          </a:blip>
+          <a:srcRect t="5085" r="-11" b="6948"/>
+          <a:stretch/>
+        </p:blipFill>
+        <p:spPr>
+          <a:xfrm>
+            <a:off x="7547810" y="10"/>
+            <a:ext cx="4641013" cy="6856310"/>
+          </a:xfrm>
+          <a:prstGeom prst="rect">
+            <a:avLst/>
+          </a:prstGeom>
+          <a:ln>
+            <a:noFill/>
+          </a:ln>
+          <a:effectLst/>
+        </p:spPr>
+      </p:pic>
+      <p:sp>
+        <p:nvSpPr>
+          <p:cNvPr id="85" name="Rectangle 58">
+            <a:extLst>
+              <a:ext uri="{FF2B5EF4-FFF2-40B4-BE49-F238E27FC236}">
+                <a16:creationId xmlns:a16="http://schemas.microsoft.com/office/drawing/2014/main" id="{C493E730-2044-49B5-A022-B8D6F359343E}"/>
+              </a:ext>
+              <a:ext uri="{C183D7F6-B498-43B3-948B-1728B52AA6E4}">
+                <adec:decorative xmlns:adec="http://schemas.microsoft.com/office/drawing/2017/decorative" val="1"/>
+              </a:ext>
+            </a:extLst>
+          </p:cNvPr>
+          <p:cNvSpPr>
+            <a:spLocks noGrp="1" noRot="1" noChangeAspect="1" noMove="1" noResize="1" noEditPoints="1" noAdjustHandles="1" noChangeArrowheads="1" noChangeShapeType="1" noTextEdit="1"/>
+          </p:cNvSpPr>
+          <p:nvPr>
+            <p:extLst>
+              <p:ext uri="{386F3935-93C4-4BCD-93E2-E3B085C9AB24}">
+                <p16:designElem xmlns:p16="http://schemas.microsoft.com/office/powerpoint/2015/main" val="1"/>
+              </p:ext>
+            </p:extLst>
+          </p:nvPr>
+        </p:nvSpPr>
+        <p:spPr bwMode="grayWhite">
+          <a:xfrm>
+            <a:off x="2" y="609600"/>
+            <a:ext cx="7967048" cy="1368198"/>
+          </a:xfrm>
+          <a:prstGeom prst="rect">
+            <a:avLst/>
+          </a:prstGeom>
+          <a:solidFill>
+            <a:schemeClr val="bg1">
+              <a:lumMod val="85000"/>
+              <a:lumOff val="15000"/>
+            </a:schemeClr>
+          </a:solidFill>
+          <a:ln>
+            <a:noFill/>
+          </a:ln>
+        </p:spPr>
+        <p:style>
+          <a:lnRef idx="2">
+            <a:schemeClr val="accent1">
+              <a:shade val="50000"/>
+            </a:schemeClr>
+          </a:lnRef>
+          <a:fillRef idx="1">
+            <a:schemeClr val="accent1"/>
+          </a:fillRef>
+          <a:effectRef idx="0">
+            <a:schemeClr val="accent1"/>
+          </a:effectRef>
+          <a:fontRef idx="minor">
+            <a:schemeClr val="lt1"/>
+          </a:fontRef>
+        </p:style>
+        <p:txBody>
+          <a:bodyPr/>
+          <a:lstStyle/>
+          <a:p>
+            <a:endParaRPr lang="sv-SE"/>
+          </a:p>
+        </p:txBody>
+      </p:sp>
       <p:sp>
         <p:nvSpPr>
           <p:cNvPr id="2" name="Title 1">
@@ -7893,21 +8168,74 @@
             <p:ph type="title"/>
           </p:nvPr>
         </p:nvSpPr>
-        <p:spPr/>
-        <p:txBody>
-          <a:bodyPr/>
+        <p:spPr>
+          <a:xfrm>
+            <a:off x="680321" y="753228"/>
+            <a:ext cx="7087552" cy="1080938"/>
+          </a:xfrm>
+        </p:spPr>
+        <p:txBody>
+          <a:bodyPr>
+            <a:normAutofit/>
+          </a:bodyPr>
           <a:lstStyle/>
           <a:p>
             <a:r>
-              <a:rPr lang="en-US" dirty="0"/>
-              <a:t>Hand-drawing concept (s)</a:t>
-            </a:r>
-          </a:p>
-        </p:txBody>
-      </p:sp>
-      <p:sp>
-        <p:nvSpPr>
-          <p:cNvPr id="3" name="Content Placeholder 2">
+              <a:rPr lang="en-US"/>
+              <a:t>Hand-drawing concept</a:t>
+            </a:r>
+            <a:endParaRPr lang="en-US" dirty="0"/>
+          </a:p>
+        </p:txBody>
+      </p:sp>
+      <p:pic>
+        <p:nvPicPr>
+          <p:cNvPr id="86" name="Picture 60">
+            <a:extLst>
+              <a:ext uri="{FF2B5EF4-FFF2-40B4-BE49-F238E27FC236}">
+                <a16:creationId xmlns:a16="http://schemas.microsoft.com/office/drawing/2014/main" id="{78976801-4346-4636-BA62-265C81DFE7C4}"/>
+              </a:ext>
+              <a:ext uri="{C183D7F6-B498-43B3-948B-1728B52AA6E4}">
+                <adec:decorative xmlns:adec="http://schemas.microsoft.com/office/drawing/2017/decorative" val="1"/>
+              </a:ext>
+            </a:extLst>
+          </p:cNvPr>
+          <p:cNvPicPr>
+            <a:picLocks noGrp="1" noRot="1" noChangeAspect="1" noMove="1" noResize="1" noEditPoints="1" noAdjustHandles="1" noChangeArrowheads="1" noChangeShapeType="1" noCrop="1"/>
+          </p:cNvPicPr>
+          <p:nvPr>
+            <p:extLst>
+              <p:ext uri="{386F3935-93C4-4BCD-93E2-E3B085C9AB24}">
+                <p16:designElem xmlns:p16="http://schemas.microsoft.com/office/powerpoint/2015/main" val="1"/>
+              </p:ext>
+            </p:extLst>
+          </p:nvPr>
+        </p:nvPicPr>
+        <p:blipFill>
+          <a:blip r:embed="rId4">
+            <a:extLst>
+              <a:ext uri="{28A0092B-C50C-407E-A947-70E740481C1C}">
+                <a14:useLocalDpi xmlns:a14="http://schemas.microsoft.com/office/drawing/2010/main" val="0"/>
+              </a:ext>
+            </a:extLst>
+          </a:blip>
+          <a:stretch>
+            <a:fillRect/>
+          </a:stretch>
+        </p:blipFill>
+        <p:spPr>
+          <a:xfrm>
+            <a:off x="2" y="1970240"/>
+            <a:ext cx="7967048" cy="321164"/>
+          </a:xfrm>
+          <a:prstGeom prst="rect">
+            <a:avLst/>
+          </a:prstGeom>
+        </p:spPr>
+      </p:pic>
+      <p:sp>
+        <p:nvSpPr>
+          <p:cNvPr id="87" name="Content Placeholder 2">
             <a:extLst>
               <a:ext uri="{FF2B5EF4-FFF2-40B4-BE49-F238E27FC236}">
                 <a16:creationId xmlns:a16="http://schemas.microsoft.com/office/drawing/2014/main" id="{C5C4975E-5761-4EB0-A33D-5DCC8DAA8117}"/>
@@ -7921,24 +8249,79 @@
             <p:ph idx="1"/>
           </p:nvPr>
         </p:nvSpPr>
-        <p:spPr/>
-        <p:txBody>
-          <a:bodyPr/>
+        <p:spPr>
+          <a:xfrm>
+            <a:off x="680321" y="2336873"/>
+            <a:ext cx="6423211" cy="3599316"/>
+          </a:xfrm>
+        </p:spPr>
+        <p:txBody>
+          <a:bodyPr>
+            <a:normAutofit/>
+          </a:bodyPr>
           <a:lstStyle/>
           <a:p>
             <a:r>
-              <a:rPr lang="en-US" dirty="0"/>
-              <a:t>You might choose one or more and explain the rationale for down-selection.</a:t>
-            </a:r>
-          </a:p>
-          <a:p>
-            <a:endParaRPr lang="en-US" dirty="0"/>
-          </a:p>
-          <a:p>
-            <a:endParaRPr lang="en-US" dirty="0"/>
-          </a:p>
-        </p:txBody>
-      </p:sp>
+              <a:rPr lang="en-US" sz="2000"/>
+              <a:t>Turboprop – the perfect engine for the job</a:t>
+            </a:r>
+          </a:p>
+          <a:p>
+            <a:r>
+              <a:rPr lang="en-US" sz="2000"/>
+              <a:t>Top wing - allowing for a bigger propeller</a:t>
+            </a:r>
+          </a:p>
+          <a:p>
+            <a:r>
+              <a:rPr lang="en-US" sz="2000"/>
+              <a:t>Wing root tanks – an eagle needs its shoulders</a:t>
+            </a:r>
+          </a:p>
+          <a:p>
+            <a:endParaRPr lang="en-US" sz="2000"/>
+          </a:p>
+          <a:p>
+            <a:endParaRPr lang="en-US" sz="2000"/>
+          </a:p>
+        </p:txBody>
+      </p:sp>
+      <p:pic>
+        <p:nvPicPr>
+          <p:cNvPr id="11" name="Bildobjekt 10" descr="En bild som visar skiss, linje, diagram, antenn&#10;&#10;Automatiskt genererad beskrivning">
+            <a:extLst>
+              <a:ext uri="{FF2B5EF4-FFF2-40B4-BE49-F238E27FC236}">
+                <a16:creationId xmlns:a16="http://schemas.microsoft.com/office/drawing/2014/main" id="{C49C98FF-0F13-9B8B-3CA3-FC11A98E70E9}"/>
+              </a:ext>
+            </a:extLst>
+          </p:cNvPr>
+          <p:cNvPicPr>
+            <a:picLocks noChangeAspect="1"/>
+          </p:cNvPicPr>
+          <p:nvPr/>
+        </p:nvPicPr>
+        <p:blipFill>
+          <a:blip r:embed="rId5">
+            <a:extLst>
+              <a:ext uri="{28A0092B-C50C-407E-A947-70E740481C1C}">
+                <a14:useLocalDpi xmlns:a14="http://schemas.microsoft.com/office/drawing/2010/main" val="0"/>
+              </a:ext>
+            </a:extLst>
+          </a:blip>
+          <a:stretch>
+            <a:fillRect/>
+          </a:stretch>
+        </p:blipFill>
+        <p:spPr>
+          <a:xfrm>
+            <a:off x="3803372" y="4937072"/>
+            <a:ext cx="8388628" cy="1919248"/>
+          </a:xfrm>
+          <a:prstGeom prst="rect">
+            <a:avLst/>
+          </a:prstGeom>
+        </p:spPr>
+      </p:pic>
     </p:spTree>
     <p:extLst>
       <p:ext uri="{BB962C8B-B14F-4D97-AF65-F5344CB8AC3E}">
@@ -8088,6 +8471,14 @@
 <file path=ppt/slides/slide4.xml><?xml version="1.0" encoding="utf-8"?>
 <p:sld xmlns:a="http://schemas.openxmlformats.org/drawingml/2006/main" xmlns:r="http://schemas.openxmlformats.org/officeDocument/2006/relationships" xmlns:p="http://schemas.openxmlformats.org/presentationml/2006/main">
   <p:cSld>
+    <p:bg>
+      <p:bgPr>
+        <a:solidFill>
+          <a:schemeClr val="bg1"/>
+        </a:solidFill>
+        <a:effectLst/>
+      </p:bgPr>
+    </p:bg>
     <p:spTree>
       <p:nvGrpSpPr>
         <p:cNvPr id="1" name=""/>
@@ -8102,6 +8493,234 @@
           <a:chExt cx="0" cy="0"/>
         </a:xfrm>
       </p:grpSpPr>
+      <p:pic>
+        <p:nvPicPr>
+          <p:cNvPr id="21" name="Picture 9">
+            <a:extLst>
+              <a:ext uri="{FF2B5EF4-FFF2-40B4-BE49-F238E27FC236}">
+                <a16:creationId xmlns:a16="http://schemas.microsoft.com/office/drawing/2014/main" id="{D8DF5C3E-BDAB-40E6-A40B-8C05D8CD3F52}"/>
+              </a:ext>
+              <a:ext uri="{C183D7F6-B498-43B3-948B-1728B52AA6E4}">
+                <adec:decorative xmlns:adec="http://schemas.microsoft.com/office/drawing/2017/decorative" val="1"/>
+              </a:ext>
+            </a:extLst>
+          </p:cNvPr>
+          <p:cNvPicPr>
+            <a:picLocks noGrp="1" noRot="1" noChangeAspect="1" noMove="1" noResize="1" noEditPoints="1" noAdjustHandles="1" noChangeArrowheads="1" noChangeShapeType="1" noCrop="1"/>
+          </p:cNvPicPr>
+          <p:nvPr>
+            <p:extLst>
+              <p:ext uri="{386F3935-93C4-4BCD-93E2-E3B085C9AB24}">
+                <p16:designElem xmlns:p16="http://schemas.microsoft.com/office/powerpoint/2015/main" val="1"/>
+              </p:ext>
+            </p:extLst>
+          </p:nvPr>
+        </p:nvPicPr>
+        <p:blipFill>
+          <a:blip r:embed="rId2">
+            <a:alphaModFix amt="10000"/>
+            <a:extLst>
+              <a:ext uri="{28A0092B-C50C-407E-A947-70E740481C1C}">
+                <a14:useLocalDpi xmlns:a14="http://schemas.microsoft.com/office/drawing/2010/main" val="0"/>
+              </a:ext>
+            </a:extLst>
+          </a:blip>
+          <a:stretch>
+            <a:fillRect/>
+          </a:stretch>
+        </p:blipFill>
+        <p:spPr>
+          <a:xfrm>
+            <a:off x="0" y="0"/>
+            <a:ext cx="12192000" cy="6858000"/>
+          </a:xfrm>
+          <a:prstGeom prst="rect">
+            <a:avLst/>
+          </a:prstGeom>
+          <a:gradFill>
+            <a:gsLst>
+              <a:gs pos="0">
+                <a:srgbClr val="F78925"/>
+              </a:gs>
+              <a:gs pos="50000">
+                <a:srgbClr val="D54209"/>
+              </a:gs>
+              <a:gs pos="100000">
+                <a:srgbClr val="8D0000"/>
+              </a:gs>
+            </a:gsLst>
+            <a:lin ang="2520000" scaled="0"/>
+          </a:gradFill>
+        </p:spPr>
+      </p:pic>
+      <p:pic>
+        <p:nvPicPr>
+          <p:cNvPr id="22" name="Picture 11">
+            <a:extLst>
+              <a:ext uri="{FF2B5EF4-FFF2-40B4-BE49-F238E27FC236}">
+                <a16:creationId xmlns:a16="http://schemas.microsoft.com/office/drawing/2014/main" id="{9D90C31A-86E3-472B-B929-496667598EFF}"/>
+              </a:ext>
+              <a:ext uri="{C183D7F6-B498-43B3-948B-1728B52AA6E4}">
+                <adec:decorative xmlns:adec="http://schemas.microsoft.com/office/drawing/2017/decorative" val="1"/>
+              </a:ext>
+            </a:extLst>
+          </p:cNvPr>
+          <p:cNvPicPr>
+            <a:picLocks noGrp="1" noRot="1" noChangeAspect="1" noMove="1" noResize="1" noEditPoints="1" noAdjustHandles="1" noChangeArrowheads="1" noChangeShapeType="1" noCrop="1"/>
+          </p:cNvPicPr>
+          <p:nvPr>
+            <p:extLst>
+              <p:ext uri="{386F3935-93C4-4BCD-93E2-E3B085C9AB24}">
+                <p16:designElem xmlns:p16="http://schemas.microsoft.com/office/powerpoint/2015/main" val="1"/>
+              </p:ext>
+            </p:extLst>
+          </p:nvPr>
+        </p:nvPicPr>
+        <p:blipFill>
+          <a:blip r:embed="rId2">
+            <a:alphaModFix amt="10000"/>
+            <a:extLst>
+              <a:ext uri="{28A0092B-C50C-407E-A947-70E740481C1C}">
+                <a14:useLocalDpi xmlns:a14="http://schemas.microsoft.com/office/drawing/2010/main" val="0"/>
+              </a:ext>
+            </a:extLst>
+          </a:blip>
+          <a:stretch>
+            <a:fillRect/>
+          </a:stretch>
+        </p:blipFill>
+        <p:spPr>
+          <a:xfrm>
+            <a:off x="0" y="0"/>
+            <a:ext cx="12192000" cy="6858000"/>
+          </a:xfrm>
+          <a:prstGeom prst="rect">
+            <a:avLst/>
+          </a:prstGeom>
+        </p:spPr>
+      </p:pic>
+      <p:sp>
+        <p:nvSpPr>
+          <p:cNvPr id="23" name="Rectangle 13">
+            <a:extLst>
+              <a:ext uri="{FF2B5EF4-FFF2-40B4-BE49-F238E27FC236}">
+                <a16:creationId xmlns:a16="http://schemas.microsoft.com/office/drawing/2014/main" id="{9DD3589A-DB65-424B-ACF1-5C8155F1C3A8}"/>
+              </a:ext>
+              <a:ext uri="{C183D7F6-B498-43B3-948B-1728B52AA6E4}">
+                <adec:decorative xmlns:adec="http://schemas.microsoft.com/office/drawing/2017/decorative" val="1"/>
+              </a:ext>
+            </a:extLst>
+          </p:cNvPr>
+          <p:cNvSpPr>
+            <a:spLocks noGrp="1" noRot="1" noChangeAspect="1" noMove="1" noResize="1" noEditPoints="1" noAdjustHandles="1" noChangeArrowheads="1" noChangeShapeType="1" noTextEdit="1"/>
+          </p:cNvSpPr>
+          <p:nvPr>
+            <p:extLst>
+              <p:ext uri="{386F3935-93C4-4BCD-93E2-E3B085C9AB24}">
+                <p16:designElem xmlns:p16="http://schemas.microsoft.com/office/powerpoint/2015/main" val="1"/>
+              </p:ext>
+            </p:extLst>
+          </p:nvPr>
+        </p:nvSpPr>
+        <p:spPr>
+          <a:xfrm>
+            <a:off x="6096000" y="0"/>
+            <a:ext cx="6096000" cy="6858001"/>
+          </a:xfrm>
+          <a:prstGeom prst="rect">
+            <a:avLst/>
+          </a:prstGeom>
+          <a:ln>
+            <a:noFill/>
+          </a:ln>
+        </p:spPr>
+        <p:style>
+          <a:lnRef idx="2">
+            <a:schemeClr val="accent1">
+              <a:shade val="50000"/>
+            </a:schemeClr>
+          </a:lnRef>
+          <a:fillRef idx="1">
+            <a:schemeClr val="accent1"/>
+          </a:fillRef>
+          <a:effectRef idx="0">
+            <a:schemeClr val="accent1"/>
+          </a:effectRef>
+          <a:fontRef idx="minor">
+            <a:schemeClr val="lt1"/>
+          </a:fontRef>
+        </p:style>
+        <p:txBody>
+          <a:bodyPr rtlCol="0" anchor="ctr"/>
+          <a:lstStyle/>
+          <a:p>
+            <a:pPr algn="ctr"/>
+            <a:endParaRPr lang="en-US"/>
+          </a:p>
+        </p:txBody>
+      </p:sp>
+      <p:sp>
+        <p:nvSpPr>
+          <p:cNvPr id="24" name="Rectangle 15">
+            <a:extLst>
+              <a:ext uri="{FF2B5EF4-FFF2-40B4-BE49-F238E27FC236}">
+                <a16:creationId xmlns:a16="http://schemas.microsoft.com/office/drawing/2014/main" id="{9F784D76-D302-4160-A2D4-C2F4AB76D478}"/>
+              </a:ext>
+              <a:ext uri="{C183D7F6-B498-43B3-948B-1728B52AA6E4}">
+                <adec:decorative xmlns:adec="http://schemas.microsoft.com/office/drawing/2017/decorative" val="1"/>
+              </a:ext>
+            </a:extLst>
+          </p:cNvPr>
+          <p:cNvSpPr>
+            <a:spLocks noGrp="1" noRot="1" noChangeAspect="1" noMove="1" noResize="1" noEditPoints="1" noAdjustHandles="1" noChangeArrowheads="1" noChangeShapeType="1" noTextEdit="1"/>
+          </p:cNvSpPr>
+          <p:nvPr>
+            <p:extLst>
+              <p:ext uri="{386F3935-93C4-4BCD-93E2-E3B085C9AB24}">
+                <p16:designElem xmlns:p16="http://schemas.microsoft.com/office/powerpoint/2015/main" val="1"/>
+              </p:ext>
+            </p:extLst>
+          </p:nvPr>
+        </p:nvSpPr>
+        <p:spPr bwMode="grayWhite">
+          <a:xfrm>
+            <a:off x="2" y="609600"/>
+            <a:ext cx="6412862" cy="1368198"/>
+          </a:xfrm>
+          <a:prstGeom prst="rect">
+            <a:avLst/>
+          </a:prstGeom>
+          <a:solidFill>
+            <a:srgbClr val="0D0D0D"/>
+          </a:solidFill>
+          <a:ln>
+            <a:noFill/>
+          </a:ln>
+        </p:spPr>
+        <p:style>
+          <a:lnRef idx="2">
+            <a:schemeClr val="accent1">
+              <a:shade val="50000"/>
+            </a:schemeClr>
+          </a:lnRef>
+          <a:fillRef idx="1">
+            <a:schemeClr val="accent1"/>
+          </a:fillRef>
+          <a:effectRef idx="0">
+            <a:schemeClr val="accent1"/>
+          </a:effectRef>
+          <a:fontRef idx="minor">
+            <a:schemeClr val="lt1"/>
+          </a:fontRef>
+        </p:style>
+        <p:txBody>
+          <a:bodyPr/>
+          <a:lstStyle/>
+          <a:p>
+            <a:endParaRPr lang="sv-SE"/>
+          </a:p>
+        </p:txBody>
+      </p:sp>
       <p:sp>
         <p:nvSpPr>
           <p:cNvPr id="2" name="Title 1">
@@ -8118,7 +8737,12 @@
             <p:ph type="title"/>
           </p:nvPr>
         </p:nvSpPr>
-        <p:spPr/>
+        <p:spPr>
+          <a:xfrm>
+            <a:off x="680321" y="753228"/>
+            <a:ext cx="5584677" cy="1080938"/>
+          </a:xfrm>
+        </p:spPr>
         <p:txBody>
           <a:bodyPr>
             <a:normAutofit/>
@@ -8126,12 +8750,61 @@
           <a:lstStyle/>
           <a:p>
             <a:r>
-              <a:rPr lang="en-US"/>
+              <a:rPr lang="en-US">
+                <a:solidFill>
+                  <a:srgbClr val="FFFFFF"/>
+                </a:solidFill>
+              </a:rPr>
               <a:t>Technology Assumptions – Engine performance</a:t>
             </a:r>
           </a:p>
         </p:txBody>
       </p:sp>
+      <p:pic>
+        <p:nvPicPr>
+          <p:cNvPr id="25" name="Picture 17">
+            <a:extLst>
+              <a:ext uri="{FF2B5EF4-FFF2-40B4-BE49-F238E27FC236}">
+                <a16:creationId xmlns:a16="http://schemas.microsoft.com/office/drawing/2014/main" id="{608D9710-1A5F-4D24-B654-F2081DE6014C}"/>
+              </a:ext>
+              <a:ext uri="{C183D7F6-B498-43B3-948B-1728B52AA6E4}">
+                <adec:decorative xmlns:adec="http://schemas.microsoft.com/office/drawing/2017/decorative" val="1"/>
+              </a:ext>
+            </a:extLst>
+          </p:cNvPr>
+          <p:cNvPicPr>
+            <a:picLocks noGrp="1" noRot="1" noChangeAspect="1" noMove="1" noResize="1" noEditPoints="1" noAdjustHandles="1" noChangeArrowheads="1" noChangeShapeType="1" noCrop="1"/>
+          </p:cNvPicPr>
+          <p:nvPr>
+            <p:extLst>
+              <p:ext uri="{386F3935-93C4-4BCD-93E2-E3B085C9AB24}">
+                <p16:designElem xmlns:p16="http://schemas.microsoft.com/office/powerpoint/2015/main" val="1"/>
+              </p:ext>
+            </p:extLst>
+          </p:nvPr>
+        </p:nvPicPr>
+        <p:blipFill>
+          <a:blip r:embed="rId3">
+            <a:extLst>
+              <a:ext uri="{28A0092B-C50C-407E-A947-70E740481C1C}">
+                <a14:useLocalDpi xmlns:a14="http://schemas.microsoft.com/office/drawing/2010/main" val="0"/>
+              </a:ext>
+            </a:extLst>
+          </a:blip>
+          <a:stretch>
+            <a:fillRect/>
+          </a:stretch>
+        </p:blipFill>
+        <p:spPr>
+          <a:xfrm>
+            <a:off x="2" y="1970241"/>
+            <a:ext cx="6409944" cy="258395"/>
+          </a:xfrm>
+          <a:prstGeom prst="rect">
+            <a:avLst/>
+          </a:prstGeom>
+        </p:spPr>
+      </p:pic>
       <p:sp>
         <p:nvSpPr>
           <p:cNvPr id="3" name="Content Placeholder 2">
@@ -8148,27 +8821,146 @@
             <p:ph idx="1"/>
           </p:nvPr>
         </p:nvSpPr>
-        <p:spPr/>
-        <p:txBody>
-          <a:bodyPr/>
+        <p:spPr>
+          <a:xfrm>
+            <a:off x="680321" y="2336873"/>
+            <a:ext cx="5104843" cy="3599316"/>
+          </a:xfrm>
+        </p:spPr>
+        <p:txBody>
+          <a:bodyPr>
+            <a:normAutofit/>
+          </a:bodyPr>
           <a:lstStyle/>
           <a:p>
             <a:r>
-              <a:rPr lang="en-US" dirty="0"/>
-              <a:t>You should be flying your engine in the future, how will it perform.</a:t>
-            </a:r>
-          </a:p>
-          <a:p>
-            <a:endParaRPr lang="en-US" dirty="0"/>
-          </a:p>
-          <a:p>
-            <a:r>
-              <a:rPr lang="en-US" dirty="0"/>
-              <a:t>SFC = 8.29 mg/Ns</a:t>
-            </a:r>
-          </a:p>
-        </p:txBody>
-      </p:sp>
+              <a:rPr lang="en-US" sz="2000" dirty="0">
+                <a:solidFill>
+                  <a:srgbClr val="FFFFFF"/>
+                </a:solidFill>
+              </a:rPr>
+              <a:t>SFC = 11.4 mg/Ns</a:t>
+            </a:r>
+          </a:p>
+          <a:p>
+            <a:r>
+              <a:rPr lang="en-US" sz="2000" dirty="0">
+                <a:solidFill>
+                  <a:srgbClr val="FFFFFF"/>
+                </a:solidFill>
+              </a:rPr>
+              <a:t>Tried to do a dimensional analysis to get for hydrogen, but to no avail</a:t>
+            </a:r>
+          </a:p>
+        </p:txBody>
+      </p:sp>
+      <p:sp useBgFill="1">
+        <p:nvSpPr>
+          <p:cNvPr id="20" name="Rectangle 19">
+            <a:extLst>
+              <a:ext uri="{FF2B5EF4-FFF2-40B4-BE49-F238E27FC236}">
+                <a16:creationId xmlns:a16="http://schemas.microsoft.com/office/drawing/2014/main" id="{2B57E7D2-A94B-4A8D-B58F-D3E30C2353DE}"/>
+              </a:ext>
+              <a:ext uri="{C183D7F6-B498-43B3-948B-1728B52AA6E4}">
+                <adec:decorative xmlns:adec="http://schemas.microsoft.com/office/drawing/2017/decorative" val="1"/>
+              </a:ext>
+            </a:extLst>
+          </p:cNvPr>
+          <p:cNvSpPr>
+            <a:spLocks noGrp="1" noRot="1" noChangeAspect="1" noMove="1" noResize="1" noEditPoints="1" noAdjustHandles="1" noChangeArrowheads="1" noChangeShapeType="1" noTextEdit="1"/>
+          </p:cNvSpPr>
+          <p:nvPr>
+            <p:extLst>
+              <p:ext uri="{386F3935-93C4-4BCD-93E2-E3B085C9AB24}">
+                <p16:designElem xmlns:p16="http://schemas.microsoft.com/office/powerpoint/2015/main" val="1"/>
+              </p:ext>
+            </p:extLst>
+          </p:nvPr>
+        </p:nvSpPr>
+        <p:spPr>
+          <a:xfrm>
+            <a:off x="6733163" y="642795"/>
+            <a:ext cx="4812406" cy="5575125"/>
+          </a:xfrm>
+          <a:prstGeom prst="rect">
+            <a:avLst/>
+          </a:prstGeom>
+          <a:ln>
+            <a:noFill/>
+          </a:ln>
+          <a:effectLst>
+            <a:outerShdw blurRad="76200" dist="63500" dir="5040000" algn="t" rotWithShape="0">
+              <a:prstClr val="black">
+                <a:alpha val="41000"/>
+              </a:prstClr>
+            </a:outerShdw>
+          </a:effectLst>
+        </p:spPr>
+        <p:style>
+          <a:lnRef idx="2">
+            <a:schemeClr val="accent1">
+              <a:shade val="50000"/>
+            </a:schemeClr>
+          </a:lnRef>
+          <a:fillRef idx="1">
+            <a:schemeClr val="accent1"/>
+          </a:fillRef>
+          <a:effectRef idx="0">
+            <a:schemeClr val="accent1"/>
+          </a:effectRef>
+          <a:fontRef idx="minor">
+            <a:schemeClr val="lt1"/>
+          </a:fontRef>
+        </p:style>
+        <p:txBody>
+          <a:bodyPr rtlCol="0" anchor="ctr"/>
+          <a:lstStyle/>
+          <a:p>
+            <a:pPr algn="ctr"/>
+            <a:endParaRPr lang="en-US"/>
+          </a:p>
+        </p:txBody>
+      </p:sp>
+      <p:pic>
+        <p:nvPicPr>
+          <p:cNvPr id="5" name="Bildobjekt 4" descr="En bild som visar text, diagram, linje, Graf&#10;&#10;Automatiskt genererad beskrivning">
+            <a:extLst>
+              <a:ext uri="{FF2B5EF4-FFF2-40B4-BE49-F238E27FC236}">
+                <a16:creationId xmlns:a16="http://schemas.microsoft.com/office/drawing/2014/main" id="{84F14C60-B251-ACA2-C857-413F84A91CD3}"/>
+              </a:ext>
+            </a:extLst>
+          </p:cNvPr>
+          <p:cNvPicPr>
+            <a:picLocks noChangeAspect="1"/>
+          </p:cNvPicPr>
+          <p:nvPr/>
+        </p:nvPicPr>
+        <p:blipFill>
+          <a:blip r:embed="rId4">
+            <a:extLst>
+              <a:ext uri="{28A0092B-C50C-407E-A947-70E740481C1C}">
+                <a14:useLocalDpi xmlns:a14="http://schemas.microsoft.com/office/drawing/2010/main" val="0"/>
+              </a:ext>
+            </a:extLst>
+          </a:blip>
+          <a:stretch>
+            <a:fillRect/>
+          </a:stretch>
+        </p:blipFill>
+        <p:spPr>
+          <a:xfrm>
+            <a:off x="7043933" y="1858696"/>
+            <a:ext cx="4178419" cy="3133814"/>
+          </a:xfrm>
+          <a:prstGeom prst="rect">
+            <a:avLst/>
+          </a:prstGeom>
+          <a:ln>
+            <a:noFill/>
+          </a:ln>
+          <a:effectLst/>
+        </p:spPr>
+      </p:pic>
     </p:spTree>
     <p:extLst>
       <p:ext uri="{BB962C8B-B14F-4D97-AF65-F5344CB8AC3E}">
@@ -8177,7 +8969,7 @@
     </p:extLst>
   </p:cSld>
   <p:clrMapOvr>
-    <a:masterClrMapping/>
+    <a:overrideClrMapping bg1="lt1" tx1="dk1" bg2="lt2" tx2="dk2" accent1="accent1" accent2="accent2" accent3="accent3" accent4="accent4" accent5="accent5" accent6="accent6" hlink="hlink" folHlink="folHlink"/>
   </p:clrMapOvr>
 </p:sld>
 </file>
@@ -8393,8 +9185,8 @@
           </a:p>
         </p:txBody>
       </p:sp>
-      <mc:AlternateContent xmlns:mc="http://schemas.openxmlformats.org/markup-compatibility/2006">
-        <mc:Choice xmlns:a14="http://schemas.microsoft.com/office/drawing/2010/main" Requires="a14">
+      <mc:AlternateContent xmlns:mc="http://schemas.openxmlformats.org/markup-compatibility/2006" xmlns:a14="http://schemas.microsoft.com/office/drawing/2010/main">
+        <mc:Choice Requires="a14">
           <p:sp>
             <p:nvSpPr>
               <p:cNvPr id="3" name="Content Placeholder 2">
@@ -8502,7 +9294,7 @@
             </p:txBody>
           </p:sp>
         </mc:Choice>
-        <mc:Fallback>
+        <mc:Fallback xmlns="">
           <p:sp>
             <p:nvSpPr>
               <p:cNvPr id="3" name="Content Placeholder 2">
@@ -8600,8 +9392,8 @@
           </a:p>
         </p:txBody>
       </p:sp>
-      <mc:AlternateContent xmlns:mc="http://schemas.openxmlformats.org/markup-compatibility/2006">
-        <mc:Choice xmlns:a14="http://schemas.microsoft.com/office/drawing/2010/main" Requires="a14">
+      <mc:AlternateContent xmlns:mc="http://schemas.openxmlformats.org/markup-compatibility/2006" xmlns:a14="http://schemas.microsoft.com/office/drawing/2010/main">
+        <mc:Choice Requires="a14">
           <p:sp>
             <p:nvSpPr>
               <p:cNvPr id="3" name="Content Placeholder 2">
@@ -8729,7 +9521,7 @@
             </p:txBody>
           </p:sp>
         </mc:Choice>
-        <mc:Fallback>
+        <mc:Fallback xmlns="">
           <p:sp>
             <p:nvSpPr>
               <p:cNvPr id="3" name="Content Placeholder 2">

</xml_diff>